<commit_message>
done with writeup v1
</commit_message>
<xml_diff>
--- a/doc/graphics.pptx
+++ b/doc/graphics.pptx
@@ -6,6 +6,7 @@
   </p:sldMasterIdLst>
   <p:sldIdLst>
     <p:sldId id="257" r:id="rId2"/>
+    <p:sldId id="258" r:id="rId3"/>
   </p:sldIdLst>
   <p:sldSz cx="9144000" cy="6858000" type="screen4x3"/>
   <p:notesSz cx="6858000" cy="9144000"/>
@@ -104,6 +105,22 @@
       </a:defRPr>
     </a:lvl9pPr>
   </p:defaultTextStyle>
+  <p:extLst>
+    <p:ext uri="{EFAFB233-063F-42B5-8137-9DF3F51BA10A}">
+      <p15:sldGuideLst xmlns:p15="http://schemas.microsoft.com/office/powerpoint/2012/main">
+        <p15:guide id="1" orient="horz" pos="2160">
+          <p15:clr>
+            <a:srgbClr val="A4A3A4"/>
+          </p15:clr>
+        </p15:guide>
+        <p15:guide id="2" pos="2880">
+          <p15:clr>
+            <a:srgbClr val="A4A3A4"/>
+          </p15:clr>
+        </p15:guide>
+      </p15:sldGuideLst>
+    </p:ext>
+  </p:extLst>
 </p:presentation>
 </file>
 
@@ -288,7 +305,7 @@
           <a:p>
             <a:fld id="{86660530-D74B-CB42-B759-3B5308BDD8BD}" type="datetimeFigureOut">
               <a:rPr lang="en-US" smtClean="0"/>
-              <a:t>12/2/15</a:t>
+              <a:t>12/8/15</a:t>
             </a:fld>
             <a:endParaRPr lang="en-US"/>
           </a:p>
@@ -458,7 +475,7 @@
           <a:p>
             <a:fld id="{86660530-D74B-CB42-B759-3B5308BDD8BD}" type="datetimeFigureOut">
               <a:rPr lang="en-US" smtClean="0"/>
-              <a:t>12/2/15</a:t>
+              <a:t>12/8/15</a:t>
             </a:fld>
             <a:endParaRPr lang="en-US"/>
           </a:p>
@@ -638,7 +655,7 @@
           <a:p>
             <a:fld id="{86660530-D74B-CB42-B759-3B5308BDD8BD}" type="datetimeFigureOut">
               <a:rPr lang="en-US" smtClean="0"/>
-              <a:t>12/2/15</a:t>
+              <a:t>12/8/15</a:t>
             </a:fld>
             <a:endParaRPr lang="en-US"/>
           </a:p>
@@ -808,7 +825,7 @@
           <a:p>
             <a:fld id="{86660530-D74B-CB42-B759-3B5308BDD8BD}" type="datetimeFigureOut">
               <a:rPr lang="en-US" smtClean="0"/>
-              <a:t>12/2/15</a:t>
+              <a:t>12/8/15</a:t>
             </a:fld>
             <a:endParaRPr lang="en-US"/>
           </a:p>
@@ -1054,7 +1071,7 @@
           <a:p>
             <a:fld id="{86660530-D74B-CB42-B759-3B5308BDD8BD}" type="datetimeFigureOut">
               <a:rPr lang="en-US" smtClean="0"/>
-              <a:t>12/2/15</a:t>
+              <a:t>12/8/15</a:t>
             </a:fld>
             <a:endParaRPr lang="en-US"/>
           </a:p>
@@ -1342,7 +1359,7 @@
           <a:p>
             <a:fld id="{86660530-D74B-CB42-B759-3B5308BDD8BD}" type="datetimeFigureOut">
               <a:rPr lang="en-US" smtClean="0"/>
-              <a:t>12/2/15</a:t>
+              <a:t>12/8/15</a:t>
             </a:fld>
             <a:endParaRPr lang="en-US"/>
           </a:p>
@@ -1764,7 +1781,7 @@
           <a:p>
             <a:fld id="{86660530-D74B-CB42-B759-3B5308BDD8BD}" type="datetimeFigureOut">
               <a:rPr lang="en-US" smtClean="0"/>
-              <a:t>12/2/15</a:t>
+              <a:t>12/8/15</a:t>
             </a:fld>
             <a:endParaRPr lang="en-US"/>
           </a:p>
@@ -1882,7 +1899,7 @@
           <a:p>
             <a:fld id="{86660530-D74B-CB42-B759-3B5308BDD8BD}" type="datetimeFigureOut">
               <a:rPr lang="en-US" smtClean="0"/>
-              <a:t>12/2/15</a:t>
+              <a:t>12/8/15</a:t>
             </a:fld>
             <a:endParaRPr lang="en-US"/>
           </a:p>
@@ -1977,7 +1994,7 @@
           <a:p>
             <a:fld id="{86660530-D74B-CB42-B759-3B5308BDD8BD}" type="datetimeFigureOut">
               <a:rPr lang="en-US" smtClean="0"/>
-              <a:t>12/2/15</a:t>
+              <a:t>12/8/15</a:t>
             </a:fld>
             <a:endParaRPr lang="en-US"/>
           </a:p>
@@ -2254,7 +2271,7 @@
           <a:p>
             <a:fld id="{86660530-D74B-CB42-B759-3B5308BDD8BD}" type="datetimeFigureOut">
               <a:rPr lang="en-US" smtClean="0"/>
-              <a:t>12/2/15</a:t>
+              <a:t>12/8/15</a:t>
             </a:fld>
             <a:endParaRPr lang="en-US"/>
           </a:p>
@@ -2507,7 +2524,7 @@
           <a:p>
             <a:fld id="{86660530-D74B-CB42-B759-3B5308BDD8BD}" type="datetimeFigureOut">
               <a:rPr lang="en-US" smtClean="0"/>
-              <a:t>12/2/15</a:t>
+              <a:t>12/8/15</a:t>
             </a:fld>
             <a:endParaRPr lang="en-US"/>
           </a:p>
@@ -2720,7 +2737,7 @@
           <a:p>
             <a:fld id="{86660530-D74B-CB42-B759-3B5308BDD8BD}" type="datetimeFigureOut">
               <a:rPr lang="en-US" smtClean="0"/>
-              <a:t>12/2/15</a:t>
+              <a:t>12/8/15</a:t>
             </a:fld>
             <a:endParaRPr lang="en-US"/>
           </a:p>
@@ -3940,6 +3957,425 @@
 </p:sld>
 </file>
 
+<file path=ppt/slides/slide2.xml><?xml version="1.0" encoding="utf-8"?>
+<p:sld xmlns:a="http://schemas.openxmlformats.org/drawingml/2006/main" xmlns:r="http://schemas.openxmlformats.org/officeDocument/2006/relationships" xmlns:p="http://schemas.openxmlformats.org/presentationml/2006/main">
+  <p:cSld>
+    <p:spTree>
+      <p:nvGrpSpPr>
+        <p:cNvPr id="1" name=""/>
+        <p:cNvGrpSpPr/>
+        <p:nvPr/>
+      </p:nvGrpSpPr>
+      <p:grpSpPr>
+        <a:xfrm>
+          <a:off x="0" y="0"/>
+          <a:ext cx="0" cy="0"/>
+          <a:chOff x="0" y="0"/>
+          <a:chExt cx="0" cy="0"/>
+        </a:xfrm>
+      </p:grpSpPr>
+      <p:graphicFrame>
+        <p:nvGraphicFramePr>
+          <p:cNvPr id="4" name="Table 173"/>
+          <p:cNvGraphicFramePr>
+            <a:graphicFrameLocks noGrp="1"/>
+          </p:cNvGraphicFramePr>
+          <p:nvPr>
+            <p:extLst>
+              <p:ext uri="{D42A27DB-BD31-4B8C-83A1-F6EECF244321}">
+                <p14:modId xmlns:p14="http://schemas.microsoft.com/office/powerpoint/2010/main" val="734956501"/>
+              </p:ext>
+            </p:extLst>
+          </p:nvPr>
+        </p:nvGraphicFramePr>
+        <p:xfrm>
+          <a:off x="694267" y="1583266"/>
+          <a:ext cx="4039263" cy="2787308"/>
+        </p:xfrm>
+        <a:graphic>
+          <a:graphicData uri="http://schemas.openxmlformats.org/drawingml/2006/table">
+            <a:tbl>
+              <a:tblPr firstRow="1" bandRow="1">
+                <a:tableStyleId>{2D5ABB26-0587-4C30-8999-92F81FD0307C}</a:tableStyleId>
+              </a:tblPr>
+              <a:tblGrid>
+                <a:gridCol w="2876663"/>
+                <a:gridCol w="1162600"/>
+              </a:tblGrid>
+              <a:tr h="313267">
+                <a:tc>
+                  <a:txBody>
+                    <a:bodyPr/>
+                    <a:lstStyle/>
+                    <a:p>
+                      <a:pPr algn="ctr"/>
+                      <a:r>
+                        <a:rPr lang="en-US" sz="1200" dirty="0" smtClean="0"/>
+                        <a:t>Features</a:t>
+                      </a:r>
+                      <a:r>
+                        <a:rPr lang="en-US" sz="1200" baseline="0" dirty="0" smtClean="0"/>
+                        <a:t> Present</a:t>
+                      </a:r>
+                      <a:endParaRPr lang="en-US" sz="1200" dirty="0"/>
+                    </a:p>
+                  </a:txBody>
+                  <a:tcPr/>
+                </a:tc>
+                <a:tc>
+                  <a:txBody>
+                    <a:bodyPr/>
+                    <a:lstStyle/>
+                    <a:p>
+                      <a:pPr algn="ctr"/>
+                      <a:r>
+                        <a:rPr lang="en-US" sz="1200" dirty="0" smtClean="0"/>
+                        <a:t>Accuracy</a:t>
+                      </a:r>
+                      <a:endParaRPr lang="en-US" sz="1200" dirty="0"/>
+                    </a:p>
+                  </a:txBody>
+                  <a:tcPr/>
+                </a:tc>
+              </a:tr>
+              <a:tr h="269117">
+                <a:tc>
+                  <a:txBody>
+                    <a:bodyPr/>
+                    <a:lstStyle/>
+                    <a:p>
+                      <a:r>
+                        <a:rPr lang="en-US" sz="1200" dirty="0" smtClean="0"/>
+                        <a:t>None</a:t>
+                      </a:r>
+                      <a:endParaRPr lang="en-US" sz="1200" dirty="0"/>
+                    </a:p>
+                  </a:txBody>
+                  <a:tcPr/>
+                </a:tc>
+                <a:tc>
+                  <a:txBody>
+                    <a:bodyPr/>
+                    <a:lstStyle/>
+                    <a:p>
+                      <a:pPr algn="ctr"/>
+                      <a:r>
+                        <a:rPr lang="en-US" sz="1200" dirty="0" smtClean="0"/>
+                        <a:t>10%</a:t>
+                      </a:r>
+                      <a:endParaRPr lang="en-US" sz="1200" dirty="0"/>
+                    </a:p>
+                  </a:txBody>
+                  <a:tcPr/>
+                </a:tc>
+              </a:tr>
+              <a:tr h="269117">
+                <a:tc>
+                  <a:txBody>
+                    <a:bodyPr/>
+                    <a:lstStyle/>
+                    <a:p>
+                      <a:r>
+                        <a:rPr lang="en-US" sz="1200" dirty="0" smtClean="0"/>
+                        <a:t>+ Weekday of creation</a:t>
+                      </a:r>
+                      <a:endParaRPr lang="en-US" sz="1200" dirty="0"/>
+                    </a:p>
+                  </a:txBody>
+                  <a:tcPr/>
+                </a:tc>
+                <a:tc>
+                  <a:txBody>
+                    <a:bodyPr/>
+                    <a:lstStyle/>
+                    <a:p>
+                      <a:pPr algn="ctr"/>
+                      <a:r>
+                        <a:rPr lang="en-US" sz="1200" dirty="0" smtClean="0"/>
+                        <a:t>23.6%</a:t>
+                      </a:r>
+                      <a:endParaRPr lang="en-US" sz="1200" dirty="0"/>
+                    </a:p>
+                  </a:txBody>
+                  <a:tcPr/>
+                </a:tc>
+              </a:tr>
+              <a:tr h="269117">
+                <a:tc>
+                  <a:txBody>
+                    <a:bodyPr/>
+                    <a:lstStyle/>
+                    <a:p>
+                      <a:r>
+                        <a:rPr lang="en-US" sz="1200" dirty="0" smtClean="0"/>
+                        <a:t>+ Unix time </a:t>
+                      </a:r>
+                      <a:r>
+                        <a:rPr lang="en-US" sz="1200" baseline="0" dirty="0" smtClean="0"/>
+                        <a:t>of creation</a:t>
+                      </a:r>
+                      <a:endParaRPr lang="en-US" sz="1200" dirty="0"/>
+                    </a:p>
+                  </a:txBody>
+                  <a:tcPr/>
+                </a:tc>
+                <a:tc>
+                  <a:txBody>
+                    <a:bodyPr/>
+                    <a:lstStyle/>
+                    <a:p>
+                      <a:pPr algn="ctr"/>
+                      <a:r>
+                        <a:rPr lang="en-US" sz="1200" dirty="0" smtClean="0"/>
+                        <a:t>62.4%</a:t>
+                      </a:r>
+                      <a:endParaRPr lang="en-US" sz="1200" dirty="0" smtClean="0"/>
+                    </a:p>
+                  </a:txBody>
+                  <a:tcPr/>
+                </a:tc>
+              </a:tr>
+              <a:tr h="269117">
+                <a:tc>
+                  <a:txBody>
+                    <a:bodyPr/>
+                    <a:lstStyle/>
+                    <a:p>
+                      <a:r>
+                        <a:rPr lang="en-US" sz="1200" dirty="0" smtClean="0"/>
+                        <a:t>+ Number of inputs to Begin TXN </a:t>
+                      </a:r>
+                      <a:endParaRPr lang="en-US" sz="1200" dirty="0"/>
+                    </a:p>
+                  </a:txBody>
+                  <a:tcPr/>
+                </a:tc>
+                <a:tc>
+                  <a:txBody>
+                    <a:bodyPr/>
+                    <a:lstStyle/>
+                    <a:p>
+                      <a:pPr algn="ctr"/>
+                      <a:r>
+                        <a:rPr lang="en-US" sz="1200" dirty="0" smtClean="0"/>
+                        <a:t>64.1%</a:t>
+                      </a:r>
+                      <a:endParaRPr lang="en-US" sz="1200" dirty="0"/>
+                    </a:p>
+                  </a:txBody>
+                  <a:tcPr/>
+                </a:tc>
+              </a:tr>
+              <a:tr h="269117">
+                <a:tc>
+                  <a:txBody>
+                    <a:bodyPr/>
+                    <a:lstStyle/>
+                    <a:p>
+                      <a:r>
+                        <a:rPr lang="en-US" sz="1200" dirty="0" smtClean="0"/>
+                        <a:t>+ Number of outputs from Begin TXN</a:t>
+                      </a:r>
+                      <a:endParaRPr lang="en-US" sz="1200" dirty="0"/>
+                    </a:p>
+                  </a:txBody>
+                  <a:tcPr/>
+                </a:tc>
+                <a:tc>
+                  <a:txBody>
+                    <a:bodyPr/>
+                    <a:lstStyle/>
+                    <a:p>
+                      <a:pPr algn="ctr"/>
+                      <a:r>
+                        <a:rPr lang="en-US" sz="1200" dirty="0" smtClean="0"/>
+                        <a:t>64.5%</a:t>
+                      </a:r>
+                      <a:endParaRPr lang="en-US" sz="1200" dirty="0"/>
+                    </a:p>
+                  </a:txBody>
+                  <a:tcPr/>
+                </a:tc>
+              </a:tr>
+              <a:tr h="269117">
+                <a:tc>
+                  <a:txBody>
+                    <a:bodyPr/>
+                    <a:lstStyle/>
+                    <a:p>
+                      <a:r>
+                        <a:rPr lang="en-US" sz="1200" dirty="0" smtClean="0"/>
+                        <a:t>+ Value of TXO in BTC</a:t>
+                      </a:r>
+                      <a:endParaRPr lang="en-US" sz="1200" dirty="0"/>
+                    </a:p>
+                  </a:txBody>
+                  <a:tcPr/>
+                </a:tc>
+                <a:tc>
+                  <a:txBody>
+                    <a:bodyPr/>
+                    <a:lstStyle/>
+                    <a:p>
+                      <a:pPr algn="ctr"/>
+                      <a:r>
+                        <a:rPr lang="en-US" sz="1200" dirty="0" smtClean="0"/>
+                        <a:t>66.5%</a:t>
+                      </a:r>
+                      <a:endParaRPr lang="en-US" sz="1200" dirty="0"/>
+                    </a:p>
+                  </a:txBody>
+                  <a:tcPr/>
+                </a:tc>
+              </a:tr>
+              <a:tr h="269117">
+                <a:tc>
+                  <a:txBody>
+                    <a:bodyPr/>
+                    <a:lstStyle/>
+                    <a:p>
+                      <a:r>
+                        <a:rPr lang="en-US" sz="1200" dirty="0" smtClean="0"/>
+                        <a:t>+ TXN volume on day of creation</a:t>
+                      </a:r>
+                      <a:endParaRPr lang="en-US" sz="1200" dirty="0"/>
+                    </a:p>
+                  </a:txBody>
+                  <a:tcPr/>
+                </a:tc>
+                <a:tc>
+                  <a:txBody>
+                    <a:bodyPr/>
+                    <a:lstStyle/>
+                    <a:p>
+                      <a:pPr algn="ctr"/>
+                      <a:r>
+                        <a:rPr lang="en-US" sz="1200" dirty="0" smtClean="0"/>
+                        <a:t>78.0%</a:t>
+                      </a:r>
+                      <a:endParaRPr lang="en-US" sz="1200" dirty="0" smtClean="0"/>
+                    </a:p>
+                  </a:txBody>
+                  <a:tcPr/>
+                </a:tc>
+              </a:tr>
+              <a:tr h="279481">
+                <a:tc>
+                  <a:txBody>
+                    <a:bodyPr/>
+                    <a:lstStyle/>
+                    <a:p>
+                      <a:r>
+                        <a:rPr lang="en-US" sz="1200" dirty="0" smtClean="0"/>
+                        <a:t>+ Polynomial</a:t>
+                      </a:r>
+                      <a:r>
+                        <a:rPr lang="en-US" sz="1200" baseline="0" dirty="0" smtClean="0"/>
+                        <a:t> of BTC/USD rate</a:t>
+                      </a:r>
+                      <a:endParaRPr lang="en-US" sz="1200" dirty="0"/>
+                    </a:p>
+                  </a:txBody>
+                  <a:tcPr/>
+                </a:tc>
+                <a:tc>
+                  <a:txBody>
+                    <a:bodyPr/>
+                    <a:lstStyle/>
+                    <a:p>
+                      <a:pPr algn="ctr"/>
+                      <a:r>
+                        <a:rPr lang="en-US" sz="1200" dirty="0" smtClean="0"/>
+                        <a:t>78.01%</a:t>
+                      </a:r>
+                      <a:endParaRPr lang="en-US" sz="1200" dirty="0"/>
+                    </a:p>
+                  </a:txBody>
+                  <a:tcPr/>
+                </a:tc>
+              </a:tr>
+              <a:tr h="269117">
+                <a:tc>
+                  <a:txBody>
+                    <a:bodyPr/>
+                    <a:lstStyle/>
+                    <a:p>
+                      <a:r>
+                        <a:rPr lang="en-US" sz="1200" dirty="0" smtClean="0"/>
+                        <a:t>+ BTC/USD</a:t>
+                      </a:r>
+                      <a:r>
+                        <a:rPr lang="en-US" sz="1200" baseline="0" dirty="0" smtClean="0"/>
+                        <a:t> rate on day of creation</a:t>
+                      </a:r>
+                      <a:endParaRPr lang="en-US" sz="1200" dirty="0"/>
+                    </a:p>
+                  </a:txBody>
+                  <a:tcPr/>
+                </a:tc>
+                <a:tc>
+                  <a:txBody>
+                    <a:bodyPr/>
+                    <a:lstStyle/>
+                    <a:p>
+                      <a:pPr algn="ctr"/>
+                      <a:r>
+                        <a:rPr lang="en-US" sz="1200" smtClean="0"/>
+                        <a:t>77.6%</a:t>
+                      </a:r>
+                      <a:endParaRPr lang="en-US" sz="1200" dirty="0"/>
+                    </a:p>
+                  </a:txBody>
+                  <a:tcPr/>
+                </a:tc>
+              </a:tr>
+            </a:tbl>
+          </a:graphicData>
+        </a:graphic>
+      </p:graphicFrame>
+      <p:pic>
+        <p:nvPicPr>
+          <p:cNvPr id="2" name="Picture 1"/>
+          <p:cNvPicPr>
+            <a:picLocks noChangeAspect="1"/>
+          </p:cNvPicPr>
+          <p:nvPr/>
+        </p:nvPicPr>
+        <p:blipFill>
+          <a:blip r:embed="rId2">
+            <a:extLst>
+              <a:ext uri="{28A0092B-C50C-407E-A947-70E740481C1C}">
+                <a14:useLocalDpi xmlns:a14="http://schemas.microsoft.com/office/drawing/2010/main" val="0"/>
+              </a:ext>
+            </a:extLst>
+          </a:blip>
+          <a:stretch>
+            <a:fillRect/>
+          </a:stretch>
+        </p:blipFill>
+        <p:spPr>
+          <a:xfrm>
+            <a:off x="4995333" y="1739900"/>
+            <a:ext cx="3556000" cy="2768600"/>
+          </a:xfrm>
+          <a:prstGeom prst="rect">
+            <a:avLst/>
+          </a:prstGeom>
+        </p:spPr>
+      </p:pic>
+    </p:spTree>
+    <p:extLst>
+      <p:ext uri="{BB962C8B-B14F-4D97-AF65-F5344CB8AC3E}">
+        <p14:creationId xmlns:p14="http://schemas.microsoft.com/office/powerpoint/2010/main" val="1598613283"/>
+      </p:ext>
+    </p:extLst>
+  </p:cSld>
+  <p:clrMapOvr>
+    <a:masterClrMapping/>
+  </p:clrMapOvr>
+</p:sld>
+</file>
+
 <file path=ppt/theme/theme1.xml><?xml version="1.0" encoding="utf-8"?>
 <a:theme xmlns:a="http://schemas.openxmlformats.org/drawingml/2006/main" name="Office Theme">
   <a:themeElements>

</xml_diff>